<commit_message>
Step 9. OS Administer
Windows OS is Done.
</commit_message>
<xml_diff>
--- a/Step09-OS_Administer_presentation.pptx
+++ b/Step09-OS_Administer_presentation.pptx
@@ -6,7 +6,7 @@
     <p:sldMasterId id="2147483648" r:id="rId2"/>
   </p:sldMasterIdLst>
   <p:notesMasterIdLst>
-    <p:notesMasterId r:id="rId14"/>
+    <p:notesMasterId r:id="rId20"/>
   </p:notesMasterIdLst>
   <p:sldIdLst>
     <p:sldId id="302" r:id="rId3"/>
@@ -20,6 +20,12 @@
     <p:sldId id="309" r:id="rId11"/>
     <p:sldId id="310" r:id="rId12"/>
     <p:sldId id="311" r:id="rId13"/>
+    <p:sldId id="312" r:id="rId14"/>
+    <p:sldId id="313" r:id="rId15"/>
+    <p:sldId id="314" r:id="rId16"/>
+    <p:sldId id="315" r:id="rId17"/>
+    <p:sldId id="316" r:id="rId18"/>
+    <p:sldId id="317" r:id="rId19"/>
   </p:sldIdLst>
   <p:sldSz cx="12192000" cy="6858000"/>
   <p:notesSz cx="6858000" cy="9144000"/>
@@ -127,7 +133,7 @@
             <p14:sldId id="303"/>
           </p14:sldIdLst>
         </p14:section>
-        <p14:section name="Kubernetes" id="{09CA0578-9490-4F4F-A6FA-697E70E6C9E0}">
+        <p14:section name="LinuxOS" id="{09CA0578-9490-4F4F-A6FA-697E70E6C9E0}">
           <p14:sldIdLst>
             <p14:sldId id="256"/>
             <p14:sldId id="304"/>
@@ -138,6 +144,16 @@
             <p14:sldId id="309"/>
             <p14:sldId id="310"/>
             <p14:sldId id="311"/>
+          </p14:sldIdLst>
+        </p14:section>
+        <p14:section name="WindowsOS" id="{51F06D80-CAF8-4E80-83A9-C1582E749423}">
+          <p14:sldIdLst>
+            <p14:sldId id="312"/>
+            <p14:sldId id="313"/>
+            <p14:sldId id="314"/>
+            <p14:sldId id="315"/>
+            <p14:sldId id="316"/>
+            <p14:sldId id="317"/>
           </p14:sldIdLst>
         </p14:section>
       </p14:sectionLst>
@@ -152,7 +168,7 @@
 <file path=ppt/revisionInfo.xml><?xml version="1.0" encoding="utf-8"?>
 <p1510:revInfo xmlns:a="http://schemas.openxmlformats.org/drawingml/2006/main" xmlns:r="http://schemas.openxmlformats.org/officeDocument/2006/relationships" xmlns:p1510="http://schemas.microsoft.com/office/powerpoint/2015/10/main">
   <p1510:revLst>
-    <p1510:client id="{DF8A7973-D2F9-4DE4-AB58-89941B5B0881}" v="7" dt="2024-02-14T12:15:58.535"/>
+    <p1510:client id="{DF8A7973-D2F9-4DE4-AB58-89941B5B0881}" v="36" dt="2024-02-14T15:52:23.712"/>
   </p1510:revLst>
 </p1510:revInfo>
 </file>
@@ -5282,8 +5298,8 @@
   </pc:docChgLst>
   <pc:docChgLst>
     <pc:chgData name="Ihor Aleksandrov" userId="c3051032-6b87-4db2-b257-777a0106fbd9" providerId="ADAL" clId="{DF8A7973-D2F9-4DE4-AB58-89941B5B0881}"/>
-    <pc:docChg chg="undo custSel addSld delSld modSld modSection">
-      <pc:chgData name="Ihor Aleksandrov" userId="c3051032-6b87-4db2-b257-777a0106fbd9" providerId="ADAL" clId="{DF8A7973-D2F9-4DE4-AB58-89941B5B0881}" dt="2024-02-14T12:36:27.061" v="128" actId="1076"/>
+    <pc:docChg chg="undo custSel addSld delSld modSld sldOrd addSection modSection">
+      <pc:chgData name="Ihor Aleksandrov" userId="c3051032-6b87-4db2-b257-777a0106fbd9" providerId="ADAL" clId="{DF8A7973-D2F9-4DE4-AB58-89941B5B0881}" dt="2024-02-14T16:05:33.226" v="270" actId="732"/>
       <pc:docMkLst>
         <pc:docMk/>
       </pc:docMkLst>
@@ -5317,6 +5333,21 @@
           </ac:spMkLst>
         </pc:spChg>
       </pc:sldChg>
+      <pc:sldChg chg="modSp mod">
+        <pc:chgData name="Ihor Aleksandrov" userId="c3051032-6b87-4db2-b257-777a0106fbd9" providerId="ADAL" clId="{DF8A7973-D2F9-4DE4-AB58-89941B5B0881}" dt="2024-02-14T15:20:27.670" v="166" actId="14100"/>
+        <pc:sldMkLst>
+          <pc:docMk/>
+          <pc:sldMk cId="2972731808" sldId="303"/>
+        </pc:sldMkLst>
+        <pc:graphicFrameChg chg="mod">
+          <ac:chgData name="Ihor Aleksandrov" userId="c3051032-6b87-4db2-b257-777a0106fbd9" providerId="ADAL" clId="{DF8A7973-D2F9-4DE4-AB58-89941B5B0881}" dt="2024-02-14T15:20:27.670" v="166" actId="14100"/>
+          <ac:graphicFrameMkLst>
+            <pc:docMk/>
+            <pc:sldMk cId="2972731808" sldId="303"/>
+            <ac:graphicFrameMk id="50" creationId="{438840ED-2B50-ED19-12CF-99B1789AE150}"/>
+          </ac:graphicFrameMkLst>
+        </pc:graphicFrameChg>
+      </pc:sldChg>
       <pc:sldChg chg="addSp delSp modSp add del mod">
         <pc:chgData name="Ihor Aleksandrov" userId="c3051032-6b87-4db2-b257-777a0106fbd9" providerId="ADAL" clId="{DF8A7973-D2F9-4DE4-AB58-89941B5B0881}" dt="2024-02-14T11:52:23.166" v="43" actId="1076"/>
         <pc:sldMkLst>
@@ -5546,11 +5577,19 @@
         </pc:sldMkLst>
       </pc:sldChg>
       <pc:sldChg chg="addSp delSp modSp add mod">
-        <pc:chgData name="Ihor Aleksandrov" userId="c3051032-6b87-4db2-b257-777a0106fbd9" providerId="ADAL" clId="{DF8A7973-D2F9-4DE4-AB58-89941B5B0881}" dt="2024-02-14T12:31:51.686" v="107" actId="1076"/>
+        <pc:chgData name="Ihor Aleksandrov" userId="c3051032-6b87-4db2-b257-777a0106fbd9" providerId="ADAL" clId="{DF8A7973-D2F9-4DE4-AB58-89941B5B0881}" dt="2024-02-14T15:57:35.530" v="253" actId="20577"/>
         <pc:sldMkLst>
           <pc:docMk/>
           <pc:sldMk cId="2568485995" sldId="310"/>
         </pc:sldMkLst>
+        <pc:spChg chg="mod">
+          <ac:chgData name="Ihor Aleksandrov" userId="c3051032-6b87-4db2-b257-777a0106fbd9" providerId="ADAL" clId="{DF8A7973-D2F9-4DE4-AB58-89941B5B0881}" dt="2024-02-14T15:57:35.530" v="253" actId="20577"/>
+          <ac:spMkLst>
+            <pc:docMk/>
+            <pc:sldMk cId="2568485995" sldId="310"/>
+            <ac:spMk id="2" creationId="{53C5D828-9666-E312-B574-9FE965A7D6BE}"/>
+          </ac:spMkLst>
+        </pc:spChg>
         <pc:picChg chg="del">
           <ac:chgData name="Ihor Aleksandrov" userId="c3051032-6b87-4db2-b257-777a0106fbd9" providerId="ADAL" clId="{DF8A7973-D2F9-4DE4-AB58-89941B5B0881}" dt="2024-02-14T12:30:34.106" v="100" actId="478"/>
           <ac:picMkLst>
@@ -5614,6 +5653,21 @@
           <pc:sldMk cId="3441142325" sldId="311"/>
         </pc:sldMkLst>
       </pc:sldChg>
+      <pc:sldChg chg="modSp add mod ord">
+        <pc:chgData name="Ihor Aleksandrov" userId="c3051032-6b87-4db2-b257-777a0106fbd9" providerId="ADAL" clId="{DF8A7973-D2F9-4DE4-AB58-89941B5B0881}" dt="2024-02-14T15:19:03.581" v="138" actId="20577"/>
+        <pc:sldMkLst>
+          <pc:docMk/>
+          <pc:sldMk cId="1687161783" sldId="312"/>
+        </pc:sldMkLst>
+        <pc:spChg chg="mod">
+          <ac:chgData name="Ihor Aleksandrov" userId="c3051032-6b87-4db2-b257-777a0106fbd9" providerId="ADAL" clId="{DF8A7973-D2F9-4DE4-AB58-89941B5B0881}" dt="2024-02-14T15:19:03.581" v="138" actId="20577"/>
+          <ac:spMkLst>
+            <pc:docMk/>
+            <pc:sldMk cId="1687161783" sldId="312"/>
+            <ac:spMk id="2" creationId="{18C18207-A109-5552-1541-0ABBAA316282}"/>
+          </ac:spMkLst>
+        </pc:spChg>
+      </pc:sldChg>
       <pc:sldChg chg="add del">
         <pc:chgData name="Ihor Aleksandrov" userId="c3051032-6b87-4db2-b257-777a0106fbd9" providerId="ADAL" clId="{DF8A7973-D2F9-4DE4-AB58-89941B5B0881}" dt="2024-02-14T11:49:37.378" v="37" actId="47"/>
         <pc:sldMkLst>
@@ -5628,6 +5682,108 @@
           <pc:sldMk cId="2238873330" sldId="313"/>
         </pc:sldMkLst>
       </pc:sldChg>
+      <pc:sldChg chg="addSp delSp modSp add mod ord setBg delDesignElem">
+        <pc:chgData name="Ihor Aleksandrov" userId="c3051032-6b87-4db2-b257-777a0106fbd9" providerId="ADAL" clId="{DF8A7973-D2F9-4DE4-AB58-89941B5B0881}" dt="2024-02-14T15:25:49.717" v="182" actId="1076"/>
+        <pc:sldMkLst>
+          <pc:docMk/>
+          <pc:sldMk cId="2728358054" sldId="313"/>
+        </pc:sldMkLst>
+        <pc:spChg chg="mod">
+          <ac:chgData name="Ihor Aleksandrov" userId="c3051032-6b87-4db2-b257-777a0106fbd9" providerId="ADAL" clId="{DF8A7973-D2F9-4DE4-AB58-89941B5B0881}" dt="2024-02-14T15:21:20.637" v="179" actId="20577"/>
+          <ac:spMkLst>
+            <pc:docMk/>
+            <pc:sldMk cId="2728358054" sldId="313"/>
+            <ac:spMk id="2" creationId="{53C5D828-9666-E312-B574-9FE965A7D6BE}"/>
+          </ac:spMkLst>
+        </pc:spChg>
+        <pc:spChg chg="mod ord">
+          <ac:chgData name="Ihor Aleksandrov" userId="c3051032-6b87-4db2-b257-777a0106fbd9" providerId="ADAL" clId="{DF8A7973-D2F9-4DE4-AB58-89941B5B0881}" dt="2024-02-14T15:21:11.409" v="171" actId="26606"/>
+          <ac:spMkLst>
+            <pc:docMk/>
+            <pc:sldMk cId="2728358054" sldId="313"/>
+            <ac:spMk id="3" creationId="{5AA19FA0-A765-8169-03F1-928E3EF7B595}"/>
+          </ac:spMkLst>
+        </pc:spChg>
+        <pc:spChg chg="add">
+          <ac:chgData name="Ihor Aleksandrov" userId="c3051032-6b87-4db2-b257-777a0106fbd9" providerId="ADAL" clId="{DF8A7973-D2F9-4DE4-AB58-89941B5B0881}" dt="2024-02-14T15:21:11.409" v="171" actId="26606"/>
+          <ac:spMkLst>
+            <pc:docMk/>
+            <pc:sldMk cId="2728358054" sldId="313"/>
+            <ac:spMk id="9" creationId="{D4771268-CB57-404A-9271-370EB28F6090}"/>
+          </ac:spMkLst>
+        </pc:spChg>
+        <pc:spChg chg="del">
+          <ac:chgData name="Ihor Aleksandrov" userId="c3051032-6b87-4db2-b257-777a0106fbd9" providerId="ADAL" clId="{DF8A7973-D2F9-4DE4-AB58-89941B5B0881}" dt="2024-02-14T15:21:03.193" v="168"/>
+          <ac:spMkLst>
+            <pc:docMk/>
+            <pc:sldMk cId="2728358054" sldId="313"/>
+            <ac:spMk id="24" creationId="{D4771268-CB57-404A-9271-370EB28F6090}"/>
+          </ac:spMkLst>
+        </pc:spChg>
+        <pc:picChg chg="del mod">
+          <ac:chgData name="Ihor Aleksandrov" userId="c3051032-6b87-4db2-b257-777a0106fbd9" providerId="ADAL" clId="{DF8A7973-D2F9-4DE4-AB58-89941B5B0881}" dt="2024-02-14T15:21:14.035" v="172" actId="478"/>
+          <ac:picMkLst>
+            <pc:docMk/>
+            <pc:sldMk cId="2728358054" sldId="313"/>
+            <ac:picMk id="4" creationId="{32ED0E64-3ACB-35B0-E798-39D80639A0DF}"/>
+          </ac:picMkLst>
+        </pc:picChg>
+        <pc:picChg chg="add mod">
+          <ac:chgData name="Ihor Aleksandrov" userId="c3051032-6b87-4db2-b257-777a0106fbd9" providerId="ADAL" clId="{DF8A7973-D2F9-4DE4-AB58-89941B5B0881}" dt="2024-02-14T15:25:49.717" v="182" actId="1076"/>
+          <ac:picMkLst>
+            <pc:docMk/>
+            <pc:sldMk cId="2728358054" sldId="313"/>
+            <ac:picMk id="5" creationId="{1B28AA1A-E60F-3632-5A69-475FEC313F4F}"/>
+          </ac:picMkLst>
+        </pc:picChg>
+      </pc:sldChg>
+      <pc:sldChg chg="addSp delSp modSp add mod ord">
+        <pc:chgData name="Ihor Aleksandrov" userId="c3051032-6b87-4db2-b257-777a0106fbd9" providerId="ADAL" clId="{DF8A7973-D2F9-4DE4-AB58-89941B5B0881}" dt="2024-02-14T15:38:42.284" v="205" actId="1076"/>
+        <pc:sldMkLst>
+          <pc:docMk/>
+          <pc:sldMk cId="1133112284" sldId="314"/>
+        </pc:sldMkLst>
+        <pc:spChg chg="mod">
+          <ac:chgData name="Ihor Aleksandrov" userId="c3051032-6b87-4db2-b257-777a0106fbd9" providerId="ADAL" clId="{DF8A7973-D2F9-4DE4-AB58-89941B5B0881}" dt="2024-02-14T15:36:53.118" v="192" actId="20577"/>
+          <ac:spMkLst>
+            <pc:docMk/>
+            <pc:sldMk cId="1133112284" sldId="314"/>
+            <ac:spMk id="2" creationId="{53C5D828-9666-E312-B574-9FE965A7D6BE}"/>
+          </ac:spMkLst>
+        </pc:spChg>
+        <pc:picChg chg="add del mod">
+          <ac:chgData name="Ihor Aleksandrov" userId="c3051032-6b87-4db2-b257-777a0106fbd9" providerId="ADAL" clId="{DF8A7973-D2F9-4DE4-AB58-89941B5B0881}" dt="2024-02-14T15:37:11.850" v="197"/>
+          <ac:picMkLst>
+            <pc:docMk/>
+            <pc:sldMk cId="1133112284" sldId="314"/>
+            <ac:picMk id="4" creationId="{3A7C2B1C-FD99-F2C9-B18A-CE0EECD6CB48}"/>
+          </ac:picMkLst>
+        </pc:picChg>
+        <pc:picChg chg="del">
+          <ac:chgData name="Ihor Aleksandrov" userId="c3051032-6b87-4db2-b257-777a0106fbd9" providerId="ADAL" clId="{DF8A7973-D2F9-4DE4-AB58-89941B5B0881}" dt="2024-02-14T15:36:56.170" v="193" actId="478"/>
+          <ac:picMkLst>
+            <pc:docMk/>
+            <pc:sldMk cId="1133112284" sldId="314"/>
+            <ac:picMk id="5" creationId="{0FAED572-EA77-9F92-AAE0-98DD8CFA7D98}"/>
+          </ac:picMkLst>
+        </pc:picChg>
+        <pc:picChg chg="add del mod">
+          <ac:chgData name="Ihor Aleksandrov" userId="c3051032-6b87-4db2-b257-777a0106fbd9" providerId="ADAL" clId="{DF8A7973-D2F9-4DE4-AB58-89941B5B0881}" dt="2024-02-14T15:38:36.752" v="202" actId="478"/>
+          <ac:picMkLst>
+            <pc:docMk/>
+            <pc:sldMk cId="1133112284" sldId="314"/>
+            <ac:picMk id="7" creationId="{D6A3E092-477E-3EB2-F962-CBFE4BD60457}"/>
+          </ac:picMkLst>
+        </pc:picChg>
+        <pc:picChg chg="add mod">
+          <ac:chgData name="Ihor Aleksandrov" userId="c3051032-6b87-4db2-b257-777a0106fbd9" providerId="ADAL" clId="{DF8A7973-D2F9-4DE4-AB58-89941B5B0881}" dt="2024-02-14T15:38:42.284" v="205" actId="1076"/>
+          <ac:picMkLst>
+            <pc:docMk/>
+            <pc:sldMk cId="1133112284" sldId="314"/>
+            <ac:picMk id="9" creationId="{0CB9CF3F-9D7A-7D3B-EFF6-BF6952DEEE7B}"/>
+          </ac:picMkLst>
+        </pc:picChg>
+      </pc:sldChg>
       <pc:sldChg chg="add del">
         <pc:chgData name="Ihor Aleksandrov" userId="c3051032-6b87-4db2-b257-777a0106fbd9" providerId="ADAL" clId="{DF8A7973-D2F9-4DE4-AB58-89941B5B0881}" dt="2024-02-14T11:49:37.378" v="37" actId="47"/>
         <pc:sldMkLst>
@@ -5642,12 +5798,113 @@
           <pc:sldMk cId="386669968" sldId="315"/>
         </pc:sldMkLst>
       </pc:sldChg>
+      <pc:sldChg chg="addSp delSp modSp add mod ord">
+        <pc:chgData name="Ihor Aleksandrov" userId="c3051032-6b87-4db2-b257-777a0106fbd9" providerId="ADAL" clId="{DF8A7973-D2F9-4DE4-AB58-89941B5B0881}" dt="2024-02-14T15:49:05.151" v="219"/>
+        <pc:sldMkLst>
+          <pc:docMk/>
+          <pc:sldMk cId="862344913" sldId="315"/>
+        </pc:sldMkLst>
+        <pc:spChg chg="mod">
+          <ac:chgData name="Ihor Aleksandrov" userId="c3051032-6b87-4db2-b257-777a0106fbd9" providerId="ADAL" clId="{DF8A7973-D2F9-4DE4-AB58-89941B5B0881}" dt="2024-02-14T15:48:39.360" v="215" actId="20577"/>
+          <ac:spMkLst>
+            <pc:docMk/>
+            <pc:sldMk cId="862344913" sldId="315"/>
+            <ac:spMk id="2" creationId="{53C5D828-9666-E312-B574-9FE965A7D6BE}"/>
+          </ac:spMkLst>
+        </pc:spChg>
+        <pc:picChg chg="add mod">
+          <ac:chgData name="Ihor Aleksandrov" userId="c3051032-6b87-4db2-b257-777a0106fbd9" providerId="ADAL" clId="{DF8A7973-D2F9-4DE4-AB58-89941B5B0881}" dt="2024-02-14T15:48:32.840" v="211" actId="1076"/>
+          <ac:picMkLst>
+            <pc:docMk/>
+            <pc:sldMk cId="862344913" sldId="315"/>
+            <ac:picMk id="5" creationId="{0F423EE0-1771-105D-CB7E-D0D7194C8FB6}"/>
+          </ac:picMkLst>
+        </pc:picChg>
+        <pc:picChg chg="del">
+          <ac:chgData name="Ihor Aleksandrov" userId="c3051032-6b87-4db2-b257-777a0106fbd9" providerId="ADAL" clId="{DF8A7973-D2F9-4DE4-AB58-89941B5B0881}" dt="2024-02-14T15:48:26.763" v="209" actId="478"/>
+          <ac:picMkLst>
+            <pc:docMk/>
+            <pc:sldMk cId="862344913" sldId="315"/>
+            <ac:picMk id="6" creationId="{08F6759B-F297-4DF0-F8FB-E5E3481B0F79}"/>
+          </ac:picMkLst>
+        </pc:picChg>
+      </pc:sldChg>
       <pc:sldChg chg="add del">
         <pc:chgData name="Ihor Aleksandrov" userId="c3051032-6b87-4db2-b257-777a0106fbd9" providerId="ADAL" clId="{DF8A7973-D2F9-4DE4-AB58-89941B5B0881}" dt="2024-02-14T11:49:37.378" v="37" actId="47"/>
         <pc:sldMkLst>
           <pc:docMk/>
           <pc:sldMk cId="93702858" sldId="316"/>
         </pc:sldMkLst>
+      </pc:sldChg>
+      <pc:sldChg chg="addSp delSp modSp add mod ord">
+        <pc:chgData name="Ihor Aleksandrov" userId="c3051032-6b87-4db2-b257-777a0106fbd9" providerId="ADAL" clId="{DF8A7973-D2F9-4DE4-AB58-89941B5B0881}" dt="2024-02-14T15:52:52.435" v="245" actId="1076"/>
+        <pc:sldMkLst>
+          <pc:docMk/>
+          <pc:sldMk cId="1527920387" sldId="316"/>
+        </pc:sldMkLst>
+        <pc:spChg chg="mod">
+          <ac:chgData name="Ihor Aleksandrov" userId="c3051032-6b87-4db2-b257-777a0106fbd9" providerId="ADAL" clId="{DF8A7973-D2F9-4DE4-AB58-89941B5B0881}" dt="2024-02-14T15:51:35.960" v="229" actId="20577"/>
+          <ac:spMkLst>
+            <pc:docMk/>
+            <pc:sldMk cId="1527920387" sldId="316"/>
+            <ac:spMk id="2" creationId="{53C5D828-9666-E312-B574-9FE965A7D6BE}"/>
+          </ac:spMkLst>
+        </pc:spChg>
+        <pc:picChg chg="del mod">
+          <ac:chgData name="Ihor Aleksandrov" userId="c3051032-6b87-4db2-b257-777a0106fbd9" providerId="ADAL" clId="{DF8A7973-D2F9-4DE4-AB58-89941B5B0881}" dt="2024-02-14T15:51:43.461" v="233" actId="478"/>
+          <ac:picMkLst>
+            <pc:docMk/>
+            <pc:sldMk cId="1527920387" sldId="316"/>
+            <ac:picMk id="5" creationId="{49649CEC-2693-E830-B46E-A31C0B523A06}"/>
+          </ac:picMkLst>
+        </pc:picChg>
+        <pc:picChg chg="add mod ord">
+          <ac:chgData name="Ihor Aleksandrov" userId="c3051032-6b87-4db2-b257-777a0106fbd9" providerId="ADAL" clId="{DF8A7973-D2F9-4DE4-AB58-89941B5B0881}" dt="2024-02-14T15:52:47.585" v="244" actId="1076"/>
+          <ac:picMkLst>
+            <pc:docMk/>
+            <pc:sldMk cId="1527920387" sldId="316"/>
+            <ac:picMk id="6" creationId="{A4623169-C9BD-F6FF-E931-9389ADE083F5}"/>
+          </ac:picMkLst>
+        </pc:picChg>
+        <pc:picChg chg="add mod ord">
+          <ac:chgData name="Ihor Aleksandrov" userId="c3051032-6b87-4db2-b257-777a0106fbd9" providerId="ADAL" clId="{DF8A7973-D2F9-4DE4-AB58-89941B5B0881}" dt="2024-02-14T15:52:52.435" v="245" actId="1076"/>
+          <ac:picMkLst>
+            <pc:docMk/>
+            <pc:sldMk cId="1527920387" sldId="316"/>
+            <ac:picMk id="7" creationId="{C5AFF61D-FA86-2E17-1507-858507EEE762}"/>
+          </ac:picMkLst>
+        </pc:picChg>
+      </pc:sldChg>
+      <pc:sldChg chg="addSp delSp modSp add mod ord">
+        <pc:chgData name="Ihor Aleksandrov" userId="c3051032-6b87-4db2-b257-777a0106fbd9" providerId="ADAL" clId="{DF8A7973-D2F9-4DE4-AB58-89941B5B0881}" dt="2024-02-14T16:05:33.226" v="270" actId="732"/>
+        <pc:sldMkLst>
+          <pc:docMk/>
+          <pc:sldMk cId="2349704742" sldId="317"/>
+        </pc:sldMkLst>
+        <pc:spChg chg="mod">
+          <ac:chgData name="Ihor Aleksandrov" userId="c3051032-6b87-4db2-b257-777a0106fbd9" providerId="ADAL" clId="{DF8A7973-D2F9-4DE4-AB58-89941B5B0881}" dt="2024-02-14T16:05:14.599" v="264" actId="20577"/>
+          <ac:spMkLst>
+            <pc:docMk/>
+            <pc:sldMk cId="2349704742" sldId="317"/>
+            <ac:spMk id="2" creationId="{53C5D828-9666-E312-B574-9FE965A7D6BE}"/>
+          </ac:spMkLst>
+        </pc:spChg>
+        <pc:picChg chg="add mod modCrop">
+          <ac:chgData name="Ihor Aleksandrov" userId="c3051032-6b87-4db2-b257-777a0106fbd9" providerId="ADAL" clId="{DF8A7973-D2F9-4DE4-AB58-89941B5B0881}" dt="2024-02-14T16:05:33.226" v="270" actId="732"/>
+          <ac:picMkLst>
+            <pc:docMk/>
+            <pc:sldMk cId="2349704742" sldId="317"/>
+            <ac:picMk id="5" creationId="{8EDC4718-98B8-6034-BF50-9E0E916A7B98}"/>
+          </ac:picMkLst>
+        </pc:picChg>
+        <pc:picChg chg="del">
+          <ac:chgData name="Ihor Aleksandrov" userId="c3051032-6b87-4db2-b257-777a0106fbd9" providerId="ADAL" clId="{DF8A7973-D2F9-4DE4-AB58-89941B5B0881}" dt="2024-02-14T16:05:17.053" v="265" actId="478"/>
+          <ac:picMkLst>
+            <pc:docMk/>
+            <pc:sldMk cId="2349704742" sldId="317"/>
+            <ac:picMk id="8" creationId="{18EEA66F-51A8-AAB7-26A2-677C2D38B45B}"/>
+          </ac:picMkLst>
+        </pc:picChg>
       </pc:sldChg>
       <pc:sldChg chg="add del">
         <pc:chgData name="Ihor Aleksandrov" userId="c3051032-6b87-4db2-b257-777a0106fbd9" providerId="ADAL" clId="{DF8A7973-D2F9-4DE4-AB58-89941B5B0881}" dt="2024-02-14T11:49:37.378" v="37" actId="47"/>
@@ -8736,10 +8993,9 @@
         <a:lstStyle/>
         <a:p>
           <a:r>
-            <a:rPr lang="en-US"/>
-            <a:t>Kubernetes</a:t>
+            <a:rPr lang="en-US" dirty="0"/>
+            <a:t>Linux OS</a:t>
           </a:r>
-          <a:endParaRPr lang="en-US" dirty="0"/>
         </a:p>
       </dgm:t>
       <dgm:extLst>
@@ -8772,6 +9028,49 @@
         </a:p>
       </dgm:t>
     </dgm:pt>
+    <dgm:pt modelId="{85E0C06B-C4B7-4AA0-AAB7-3DBC0A05D0E1}">
+      <dgm:prSet/>
+      <dgm:spPr/>
+      <dgm:t>
+        <a:bodyPr/>
+        <a:lstStyle/>
+        <a:p>
+          <a:r>
+            <a:rPr lang="en-US" dirty="0"/>
+            <a:t>Windows OS</a:t>
+          </a:r>
+        </a:p>
+      </dgm:t>
+      <dgm:extLst>
+        <a:ext uri="{E40237B7-FDA0-4F09-8148-C483321AD2D9}">
+          <dgm14:cNvPr xmlns:dgm14="http://schemas.microsoft.com/office/drawing/2010/diagram" id="0" name="">
+            <a:hlinkClick xmlns:r="http://schemas.openxmlformats.org/officeDocument/2006/relationships" r:id="rId2" action="ppaction://hlinksldjump"/>
+          </dgm14:cNvPr>
+        </a:ext>
+      </dgm:extLst>
+    </dgm:pt>
+    <dgm:pt modelId="{47E8EEBF-805B-4DAA-8833-4170ADB9A384}" type="parTrans" cxnId="{2A21C056-B2E2-40C7-AA3B-8BBC8FC27904}">
+      <dgm:prSet/>
+      <dgm:spPr/>
+      <dgm:t>
+        <a:bodyPr/>
+        <a:lstStyle/>
+        <a:p>
+          <a:endParaRPr lang="ru-UA"/>
+        </a:p>
+      </dgm:t>
+    </dgm:pt>
+    <dgm:pt modelId="{8DF21F15-BB87-4130-9987-19BE7D2715F3}" type="sibTrans" cxnId="{2A21C056-B2E2-40C7-AA3B-8BBC8FC27904}">
+      <dgm:prSet/>
+      <dgm:spPr/>
+      <dgm:t>
+        <a:bodyPr/>
+        <a:lstStyle/>
+        <a:p>
+          <a:endParaRPr lang="ru-UA"/>
+        </a:p>
+      </dgm:t>
+    </dgm:pt>
     <dgm:pt modelId="{76D6B6BC-F8F0-4466-930A-673E438AD175}" type="pres">
       <dgm:prSet presAssocID="{1C600E66-A0CB-470F-8514-C91590285CB3}" presName="Name0" presStyleCnt="0">
         <dgm:presLayoutVars>
@@ -8787,7 +9086,24 @@
       <dgm:spPr/>
     </dgm:pt>
     <dgm:pt modelId="{FF5931E5-6577-45BF-AE5E-698950A6CB7C}" type="pres">
-      <dgm:prSet presAssocID="{64E9ACE6-9AFD-4BBA-80CB-01DA1300E087}" presName="parentText" presStyleLbl="node1" presStyleIdx="0" presStyleCnt="1">
+      <dgm:prSet presAssocID="{64E9ACE6-9AFD-4BBA-80CB-01DA1300E087}" presName="parentText" presStyleLbl="node1" presStyleIdx="0" presStyleCnt="2" custScaleX="100443">
+        <dgm:presLayoutVars>
+          <dgm:chMax val="1"/>
+          <dgm:bulletEnabled val="1"/>
+        </dgm:presLayoutVars>
+      </dgm:prSet>
+      <dgm:spPr/>
+    </dgm:pt>
+    <dgm:pt modelId="{26799C8D-9C1F-41E3-BDD9-ED3BB9E00EF8}" type="pres">
+      <dgm:prSet presAssocID="{7B2C8051-D046-465E-BB80-77D9BB7B38CD}" presName="sp" presStyleCnt="0"/>
+      <dgm:spPr/>
+    </dgm:pt>
+    <dgm:pt modelId="{647F36E0-BBAB-4213-A919-1AF21F043511}" type="pres">
+      <dgm:prSet presAssocID="{85E0C06B-C4B7-4AA0-AAB7-3DBC0A05D0E1}" presName="linNode" presStyleCnt="0"/>
+      <dgm:spPr/>
+    </dgm:pt>
+    <dgm:pt modelId="{DB705C5B-C3E3-4B67-A42D-EB634D471A72}" type="pres">
+      <dgm:prSet presAssocID="{85E0C06B-C4B7-4AA0-AAB7-3DBC0A05D0E1}" presName="parentText" presStyleLbl="node1" presStyleIdx="1" presStyleCnt="2">
         <dgm:presLayoutVars>
           <dgm:chMax val="1"/>
           <dgm:bulletEnabled val="1"/>
@@ -8797,11 +9113,16 @@
     </dgm:pt>
   </dgm:ptLst>
   <dgm:cxnLst>
+    <dgm:cxn modelId="{2A21C056-B2E2-40C7-AA3B-8BBC8FC27904}" srcId="{1C600E66-A0CB-470F-8514-C91590285CB3}" destId="{85E0C06B-C4B7-4AA0-AAB7-3DBC0A05D0E1}" srcOrd="1" destOrd="0" parTransId="{47E8EEBF-805B-4DAA-8833-4170ADB9A384}" sibTransId="{8DF21F15-BB87-4130-9987-19BE7D2715F3}"/>
     <dgm:cxn modelId="{5164DF79-C7E6-4470-A977-53A07031A3C0}" type="presOf" srcId="{1C600E66-A0CB-470F-8514-C91590285CB3}" destId="{76D6B6BC-F8F0-4466-930A-673E438AD175}" srcOrd="0" destOrd="0" presId="urn:microsoft.com/office/officeart/2005/8/layout/vList5"/>
+    <dgm:cxn modelId="{DB4D3C82-2625-4008-ADC3-2835EC3BA76B}" type="presOf" srcId="{85E0C06B-C4B7-4AA0-AAB7-3DBC0A05D0E1}" destId="{DB705C5B-C3E3-4B67-A42D-EB634D471A72}" srcOrd="0" destOrd="0" presId="urn:microsoft.com/office/officeart/2005/8/layout/vList5"/>
     <dgm:cxn modelId="{C7C38DA0-CE59-4FEF-BFD1-6FDA69259313}" srcId="{1C600E66-A0CB-470F-8514-C91590285CB3}" destId="{64E9ACE6-9AFD-4BBA-80CB-01DA1300E087}" srcOrd="0" destOrd="0" parTransId="{FD0FAFBC-EEAF-4FBF-916F-D182FE250A26}" sibTransId="{7B2C8051-D046-465E-BB80-77D9BB7B38CD}"/>
     <dgm:cxn modelId="{F2AC53BB-E0F7-4A6D-8F21-5A745B7FF3EF}" type="presOf" srcId="{64E9ACE6-9AFD-4BBA-80CB-01DA1300E087}" destId="{FF5931E5-6577-45BF-AE5E-698950A6CB7C}" srcOrd="0" destOrd="0" presId="urn:microsoft.com/office/officeart/2005/8/layout/vList5"/>
     <dgm:cxn modelId="{17EF8E67-277A-49D4-AC45-E6BAE828A53D}" type="presParOf" srcId="{76D6B6BC-F8F0-4466-930A-673E438AD175}" destId="{28572EFC-4B6F-43FA-9BAF-1372789AF0BC}" srcOrd="0" destOrd="0" presId="urn:microsoft.com/office/officeart/2005/8/layout/vList5"/>
     <dgm:cxn modelId="{BEE7790A-1A86-4AC5-926A-8684AC7E160D}" type="presParOf" srcId="{28572EFC-4B6F-43FA-9BAF-1372789AF0BC}" destId="{FF5931E5-6577-45BF-AE5E-698950A6CB7C}" srcOrd="0" destOrd="0" presId="urn:microsoft.com/office/officeart/2005/8/layout/vList5"/>
+    <dgm:cxn modelId="{5422445D-67E0-4903-BE01-CEC7FA073C16}" type="presParOf" srcId="{76D6B6BC-F8F0-4466-930A-673E438AD175}" destId="{26799C8D-9C1F-41E3-BDD9-ED3BB9E00EF8}" srcOrd="1" destOrd="0" presId="urn:microsoft.com/office/officeart/2005/8/layout/vList5"/>
+    <dgm:cxn modelId="{50E3111A-35B4-4C8D-9A49-1367EB8FBA71}" type="presParOf" srcId="{76D6B6BC-F8F0-4466-930A-673E438AD175}" destId="{647F36E0-BBAB-4213-A919-1AF21F043511}" srcOrd="2" destOrd="0" presId="urn:microsoft.com/office/officeart/2005/8/layout/vList5"/>
+    <dgm:cxn modelId="{149D35AC-E406-42FA-8666-D23882694FCB}" type="presParOf" srcId="{647F36E0-BBAB-4213-A919-1AF21F043511}" destId="{DB705C5B-C3E3-4B67-A42D-EB634D471A72}" srcOrd="0" destOrd="0" presId="urn:microsoft.com/office/officeart/2005/8/layout/vList5"/>
   </dgm:cxnLst>
   <dgm:bg/>
   <dgm:whole/>
@@ -8828,8 +9149,8 @@
       </dsp:nvSpPr>
       <dsp:spPr>
         <a:xfrm>
-          <a:off x="2044999" y="0"/>
-          <a:ext cx="2300624" cy="1629294"/>
+          <a:off x="2202484" y="36"/>
+          <a:ext cx="2494989" cy="1477331"/>
         </a:xfrm>
         <a:prstGeom prst="roundRect">
           <a:avLst/>
@@ -8871,12 +9192,12 @@
         </a:fontRef>
       </dsp:style>
       <dsp:txBody>
-        <a:bodyPr spcFirstLastPara="0" vert="horz" wrap="square" lIns="121920" tIns="60960" rIns="121920" bIns="60960" numCol="1" spcCol="1270" anchor="ctr" anchorCtr="0">
+        <a:bodyPr spcFirstLastPara="0" vert="horz" wrap="square" lIns="152400" tIns="76200" rIns="152400" bIns="76200" numCol="1" spcCol="1270" anchor="ctr" anchorCtr="0">
           <a:noAutofit/>
         </a:bodyPr>
         <a:lstStyle/>
         <a:p>
-          <a:pPr marL="0" lvl="0" indent="0" algn="ctr" defTabSz="1422400">
+          <a:pPr marL="0" lvl="0" indent="0" algn="ctr" defTabSz="1778000">
             <a:lnSpc>
               <a:spcPct val="90000"/>
             </a:lnSpc>
@@ -8889,15 +9210,92 @@
             <a:buNone/>
           </a:pPr>
           <a:r>
-            <a:rPr lang="en-US" sz="3200" kern="1200"/>
-            <a:t>Kubernetes</a:t>
+            <a:rPr lang="en-US" sz="4000" kern="1200" dirty="0"/>
+            <a:t>Linux OS</a:t>
           </a:r>
-          <a:endParaRPr lang="en-US" sz="3200" kern="1200" dirty="0"/>
         </a:p>
       </dsp:txBody>
       <dsp:txXfrm>
-        <a:off x="2124535" y="79536"/>
-        <a:ext cx="2141552" cy="1470222"/>
+        <a:off x="2274601" y="72153"/>
+        <a:ext cx="2350755" cy="1333097"/>
+      </dsp:txXfrm>
+    </dsp:sp>
+    <dsp:sp modelId="{DB705C5B-C3E3-4B67-A42D-EB634D471A72}">
+      <dsp:nvSpPr>
+        <dsp:cNvPr id="0" name=""/>
+        <dsp:cNvSpPr/>
+      </dsp:nvSpPr>
+      <dsp:spPr>
+        <a:xfrm>
+          <a:off x="2202484" y="1551235"/>
+          <a:ext cx="2483985" cy="1477331"/>
+        </a:xfrm>
+        <a:prstGeom prst="roundRect">
+          <a:avLst/>
+        </a:prstGeom>
+        <a:solidFill>
+          <a:schemeClr val="accent1">
+            <a:hueOff val="0"/>
+            <a:satOff val="0"/>
+            <a:lumOff val="0"/>
+            <a:alphaOff val="0"/>
+          </a:schemeClr>
+        </a:solidFill>
+        <a:ln w="12700" cap="flat" cmpd="sng" algn="ctr">
+          <a:solidFill>
+            <a:schemeClr val="lt1">
+              <a:hueOff val="0"/>
+              <a:satOff val="0"/>
+              <a:lumOff val="0"/>
+              <a:alphaOff val="0"/>
+            </a:schemeClr>
+          </a:solidFill>
+          <a:prstDash val="solid"/>
+          <a:miter lim="800000"/>
+        </a:ln>
+        <a:effectLst/>
+      </dsp:spPr>
+      <dsp:style>
+        <a:lnRef idx="2">
+          <a:scrgbClr r="0" g="0" b="0"/>
+        </a:lnRef>
+        <a:fillRef idx="1">
+          <a:scrgbClr r="0" g="0" b="0"/>
+        </a:fillRef>
+        <a:effectRef idx="0">
+          <a:scrgbClr r="0" g="0" b="0"/>
+        </a:effectRef>
+        <a:fontRef idx="minor">
+          <a:schemeClr val="lt1"/>
+        </a:fontRef>
+      </dsp:style>
+      <dsp:txBody>
+        <a:bodyPr spcFirstLastPara="0" vert="horz" wrap="square" lIns="152400" tIns="76200" rIns="152400" bIns="76200" numCol="1" spcCol="1270" anchor="ctr" anchorCtr="0">
+          <a:noAutofit/>
+        </a:bodyPr>
+        <a:lstStyle/>
+        <a:p>
+          <a:pPr marL="0" lvl="0" indent="0" algn="ctr" defTabSz="1778000">
+            <a:lnSpc>
+              <a:spcPct val="90000"/>
+            </a:lnSpc>
+            <a:spcBef>
+              <a:spcPct val="0"/>
+            </a:spcBef>
+            <a:spcAft>
+              <a:spcPct val="35000"/>
+            </a:spcAft>
+            <a:buNone/>
+          </a:pPr>
+          <a:r>
+            <a:rPr lang="en-US" sz="4000" kern="1200" dirty="0"/>
+            <a:t>Windows OS</a:t>
+          </a:r>
+        </a:p>
+      </dsp:txBody>
+      <dsp:txXfrm>
+        <a:off x="2274601" y="1623352"/>
+        <a:ext cx="2339751" cy="1333097"/>
       </dsp:txXfrm>
     </dsp:sp>
   </dsp:spTree>
@@ -15240,7 +15638,7 @@
                 <a:ea typeface="+mj-ea"/>
                 <a:cs typeface="+mj-cs"/>
               </a:rPr>
-              <a:t>Linux Shells</a:t>
+              <a:t>Linux Shells Scripts</a:t>
             </a:r>
           </a:p>
         </p:txBody>
@@ -15536,6 +15934,1359 @@
     <p:extLst>
       <p:ext uri="{BB962C8B-B14F-4D97-AF65-F5344CB8AC3E}">
         <p14:creationId xmlns:p14="http://schemas.microsoft.com/office/powerpoint/2010/main" val="441422193"/>
+      </p:ext>
+    </p:extLst>
+  </p:cSld>
+  <p:clrMapOvr>
+    <a:masterClrMapping/>
+  </p:clrMapOvr>
+</p:sld>
+</file>
+
+<file path=ppt/slides/slide12.xml><?xml version="1.0" encoding="utf-8"?>
+<p:sld xmlns:a="http://schemas.openxmlformats.org/drawingml/2006/main" xmlns:r="http://schemas.openxmlformats.org/officeDocument/2006/relationships" xmlns:p="http://schemas.openxmlformats.org/presentationml/2006/main">
+  <p:cSld>
+    <p:bg>
+      <p:bgPr>
+        <a:solidFill>
+          <a:schemeClr val="bg1"/>
+        </a:solidFill>
+        <a:effectLst/>
+      </p:bgPr>
+    </p:bg>
+    <p:spTree>
+      <p:nvGrpSpPr>
+        <p:cNvPr id="1" name=""/>
+        <p:cNvGrpSpPr/>
+        <p:nvPr/>
+      </p:nvGrpSpPr>
+      <p:grpSpPr>
+        <a:xfrm>
+          <a:off x="0" y="0"/>
+          <a:ext cx="0" cy="0"/>
+          <a:chOff x="0" y="0"/>
+          <a:chExt cx="0" cy="0"/>
+        </a:xfrm>
+      </p:grpSpPr>
+      <p:sp>
+        <p:nvSpPr>
+          <p:cNvPr id="9" name="Rectangle 8">
+            <a:extLst>
+              <a:ext uri="{FF2B5EF4-FFF2-40B4-BE49-F238E27FC236}">
+                <a16:creationId xmlns:a16="http://schemas.microsoft.com/office/drawing/2014/main" id="{C3896A03-3945-419A-B66B-4EE266EDD152}"/>
+              </a:ext>
+              <a:ext uri="{C183D7F6-B498-43B3-948B-1728B52AA6E4}">
+                <adec:decorative xmlns:adec="http://schemas.microsoft.com/office/drawing/2017/decorative" val="1"/>
+              </a:ext>
+            </a:extLst>
+          </p:cNvPr>
+          <p:cNvSpPr>
+            <a:spLocks noGrp="1" noRot="1" noChangeAspect="1" noMove="1" noResize="1" noEditPoints="1" noAdjustHandles="1" noChangeArrowheads="1" noChangeShapeType="1" noTextEdit="1"/>
+          </p:cNvSpPr>
+          <p:nvPr>
+            <p:extLst>
+              <p:ext uri="{386F3935-93C4-4BCD-93E2-E3B085C9AB24}">
+                <p16:designElem xmlns:p16="http://schemas.microsoft.com/office/powerpoint/2015/main" val="1"/>
+              </p:ext>
+            </p:extLst>
+          </p:nvPr>
+        </p:nvSpPr>
+        <p:spPr>
+          <a:xfrm>
+            <a:off x="10" y="0"/>
+            <a:ext cx="6083447" cy="6858001"/>
+          </a:xfrm>
+          <a:prstGeom prst="rect">
+            <a:avLst/>
+          </a:prstGeom>
+          <a:solidFill>
+            <a:schemeClr val="tx1">
+              <a:lumMod val="85000"/>
+              <a:lumOff val="15000"/>
+            </a:schemeClr>
+          </a:solidFill>
+          <a:ln>
+            <a:noFill/>
+          </a:ln>
+        </p:spPr>
+        <p:style>
+          <a:lnRef idx="2">
+            <a:schemeClr val="accent1">
+              <a:shade val="50000"/>
+            </a:schemeClr>
+          </a:lnRef>
+          <a:fillRef idx="1">
+            <a:schemeClr val="accent1"/>
+          </a:fillRef>
+          <a:effectRef idx="0">
+            <a:schemeClr val="accent1"/>
+          </a:effectRef>
+          <a:fontRef idx="minor">
+            <a:schemeClr val="lt1"/>
+          </a:fontRef>
+        </p:style>
+        <p:txBody>
+          <a:bodyPr rtlCol="0" anchor="ctr"/>
+          <a:lstStyle/>
+          <a:p>
+            <a:pPr algn="ctr"/>
+            <a:endParaRPr lang="en-US"/>
+          </a:p>
+        </p:txBody>
+      </p:sp>
+      <p:sp>
+        <p:nvSpPr>
+          <p:cNvPr id="2" name="Title 1">
+            <a:extLst>
+              <a:ext uri="{FF2B5EF4-FFF2-40B4-BE49-F238E27FC236}">
+                <a16:creationId xmlns:a16="http://schemas.microsoft.com/office/drawing/2014/main" id="{18C18207-A109-5552-1541-0ABBAA316282}"/>
+              </a:ext>
+            </a:extLst>
+          </p:cNvPr>
+          <p:cNvSpPr>
+            <a:spLocks noGrp="1"/>
+          </p:cNvSpPr>
+          <p:nvPr>
+            <p:ph type="ctrTitle"/>
+          </p:nvPr>
+        </p:nvSpPr>
+        <p:spPr>
+          <a:xfrm>
+            <a:off x="651202" y="637762"/>
+            <a:ext cx="5070725" cy="5576770"/>
+          </a:xfrm>
+        </p:spPr>
+        <p:txBody>
+          <a:bodyPr anchor="ctr">
+            <a:normAutofit/>
+          </a:bodyPr>
+          <a:lstStyle/>
+          <a:p>
+            <a:pPr algn="l"/>
+            <a:r>
+              <a:rPr lang="en-US" sz="5600" dirty="0">
+                <a:solidFill>
+                  <a:schemeClr val="bg1"/>
+                </a:solidFill>
+              </a:rPr>
+              <a:t>Windows OS</a:t>
+            </a:r>
+            <a:endParaRPr lang="ru-UA" sz="5600" dirty="0">
+              <a:solidFill>
+                <a:schemeClr val="bg1"/>
+              </a:solidFill>
+            </a:endParaRPr>
+          </a:p>
+        </p:txBody>
+      </p:sp>
+      <p:sp>
+        <p:nvSpPr>
+          <p:cNvPr id="11" name="Rectangle 10">
+            <a:extLst>
+              <a:ext uri="{FF2B5EF4-FFF2-40B4-BE49-F238E27FC236}">
+                <a16:creationId xmlns:a16="http://schemas.microsoft.com/office/drawing/2014/main" id="{B34F5AD2-EDBD-4BBD-A55C-EAFFD0C7097A}"/>
+              </a:ext>
+              <a:ext uri="{C183D7F6-B498-43B3-948B-1728B52AA6E4}">
+                <adec:decorative xmlns:adec="http://schemas.microsoft.com/office/drawing/2017/decorative" val="1"/>
+              </a:ext>
+            </a:extLst>
+          </p:cNvPr>
+          <p:cNvSpPr>
+            <a:spLocks noGrp="1" noRot="1" noChangeAspect="1" noMove="1" noResize="1" noEditPoints="1" noAdjustHandles="1" noChangeArrowheads="1" noChangeShapeType="1" noTextEdit="1"/>
+          </p:cNvSpPr>
+          <p:nvPr>
+            <p:extLst>
+              <p:ext uri="{386F3935-93C4-4BCD-93E2-E3B085C9AB24}">
+                <p16:designElem xmlns:p16="http://schemas.microsoft.com/office/powerpoint/2015/main" val="1"/>
+              </p:ext>
+            </p:extLst>
+          </p:nvPr>
+        </p:nvSpPr>
+        <p:spPr>
+          <a:xfrm>
+            <a:off x="6096000" y="0"/>
+            <a:ext cx="6095990" cy="6858001"/>
+          </a:xfrm>
+          <a:prstGeom prst="rect">
+            <a:avLst/>
+          </a:prstGeom>
+          <a:solidFill>
+            <a:schemeClr val="bg1">
+              <a:lumMod val="95000"/>
+            </a:schemeClr>
+          </a:solidFill>
+          <a:ln>
+            <a:noFill/>
+          </a:ln>
+        </p:spPr>
+        <p:style>
+          <a:lnRef idx="2">
+            <a:schemeClr val="accent1">
+              <a:shade val="50000"/>
+            </a:schemeClr>
+          </a:lnRef>
+          <a:fillRef idx="1">
+            <a:schemeClr val="accent1"/>
+          </a:fillRef>
+          <a:effectRef idx="0">
+            <a:schemeClr val="accent1"/>
+          </a:effectRef>
+          <a:fontRef idx="minor">
+            <a:schemeClr val="lt1"/>
+          </a:fontRef>
+        </p:style>
+        <p:txBody>
+          <a:bodyPr rtlCol="0" anchor="ctr"/>
+          <a:lstStyle/>
+          <a:p>
+            <a:pPr algn="ctr"/>
+            <a:endParaRPr lang="en-US"/>
+          </a:p>
+        </p:txBody>
+      </p:sp>
+      <p:sp>
+        <p:nvSpPr>
+          <p:cNvPr id="4" name="Footer Placeholder 3">
+            <a:extLst>
+              <a:ext uri="{FF2B5EF4-FFF2-40B4-BE49-F238E27FC236}">
+                <a16:creationId xmlns:a16="http://schemas.microsoft.com/office/drawing/2014/main" id="{C99D0D71-05C2-1881-DCFB-D99C1C10CBB8}"/>
+              </a:ext>
+            </a:extLst>
+          </p:cNvPr>
+          <p:cNvSpPr>
+            <a:spLocks noGrp="1"/>
+          </p:cNvSpPr>
+          <p:nvPr>
+            <p:ph type="ftr" sz="quarter" idx="11"/>
+          </p:nvPr>
+        </p:nvSpPr>
+        <p:spPr>
+          <a:xfrm rot="5400000">
+            <a:off x="-349845" y="5226028"/>
+            <a:ext cx="1663495" cy="313512"/>
+          </a:xfrm>
+        </p:spPr>
+        <p:txBody>
+          <a:bodyPr anchor="ctr">
+            <a:normAutofit/>
+          </a:bodyPr>
+          <a:lstStyle/>
+          <a:p>
+            <a:pPr algn="r">
+              <a:spcAft>
+                <a:spcPts val="600"/>
+              </a:spcAft>
+            </a:pPr>
+            <a:r>
+              <a:rPr lang="pt-BR" sz="900">
+                <a:solidFill>
+                  <a:schemeClr val="bg1"/>
+                </a:solidFill>
+              </a:rPr>
+              <a:t>Step 9. OS Administer - ver. 1</a:t>
+            </a:r>
+            <a:endParaRPr lang="ru-UA" sz="900">
+              <a:solidFill>
+                <a:schemeClr val="bg1"/>
+              </a:solidFill>
+            </a:endParaRPr>
+          </a:p>
+        </p:txBody>
+      </p:sp>
+    </p:spTree>
+    <p:extLst>
+      <p:ext uri="{BB962C8B-B14F-4D97-AF65-F5344CB8AC3E}">
+        <p14:creationId xmlns:p14="http://schemas.microsoft.com/office/powerpoint/2010/main" val="1687161783"/>
+      </p:ext>
+    </p:extLst>
+  </p:cSld>
+  <p:clrMapOvr>
+    <a:masterClrMapping/>
+  </p:clrMapOvr>
+</p:sld>
+</file>
+
+<file path=ppt/slides/slide13.xml><?xml version="1.0" encoding="utf-8"?>
+<p:sld xmlns:a="http://schemas.openxmlformats.org/drawingml/2006/main" xmlns:r="http://schemas.openxmlformats.org/officeDocument/2006/relationships" xmlns:p="http://schemas.openxmlformats.org/presentationml/2006/main">
+  <p:cSld>
+    <p:bg>
+      <p:bgPr>
+        <a:solidFill>
+          <a:schemeClr val="bg1"/>
+        </a:solidFill>
+        <a:effectLst/>
+      </p:bgPr>
+    </p:bg>
+    <p:spTree>
+      <p:nvGrpSpPr>
+        <p:cNvPr id="1" name=""/>
+        <p:cNvGrpSpPr/>
+        <p:nvPr/>
+      </p:nvGrpSpPr>
+      <p:grpSpPr>
+        <a:xfrm>
+          <a:off x="0" y="0"/>
+          <a:ext cx="0" cy="0"/>
+          <a:chOff x="0" y="0"/>
+          <a:chExt cx="0" cy="0"/>
+        </a:xfrm>
+      </p:grpSpPr>
+      <p:sp>
+        <p:nvSpPr>
+          <p:cNvPr id="9" name="Down Arrow 7">
+            <a:extLst>
+              <a:ext uri="{FF2B5EF4-FFF2-40B4-BE49-F238E27FC236}">
+                <a16:creationId xmlns:a16="http://schemas.microsoft.com/office/drawing/2014/main" id="{D4771268-CB57-404A-9271-370EB28F6090}"/>
+              </a:ext>
+              <a:ext uri="{C183D7F6-B498-43B3-948B-1728B52AA6E4}">
+                <adec:decorative xmlns:adec="http://schemas.microsoft.com/office/drawing/2017/decorative" val="1"/>
+              </a:ext>
+            </a:extLst>
+          </p:cNvPr>
+          <p:cNvSpPr>
+            <a:spLocks noGrp="1" noRot="1" noChangeAspect="1" noMove="1" noResize="1" noEditPoints="1" noAdjustHandles="1" noChangeArrowheads="1" noChangeShapeType="1" noTextEdit="1"/>
+          </p:cNvSpPr>
+          <p:nvPr>
+            <p:extLst>
+              <p:ext uri="{386F3935-93C4-4BCD-93E2-E3B085C9AB24}">
+                <p16:designElem xmlns:p16="http://schemas.microsoft.com/office/powerpoint/2015/main" val="1"/>
+              </p:ext>
+            </p:extLst>
+          </p:nvPr>
+        </p:nvSpPr>
+        <p:spPr>
+          <a:xfrm rot="16200000">
+            <a:off x="800100" y="1491343"/>
+            <a:ext cx="3333749" cy="3499103"/>
+          </a:xfrm>
+          <a:prstGeom prst="downArrow">
+            <a:avLst>
+              <a:gd name="adj1" fmla="val 100000"/>
+              <a:gd name="adj2" fmla="val 15788"/>
+            </a:avLst>
+          </a:prstGeom>
+          <a:solidFill>
+            <a:srgbClr val="404040"/>
+          </a:solidFill>
+          <a:ln w="53975">
+            <a:noFill/>
+          </a:ln>
+        </p:spPr>
+        <p:style>
+          <a:lnRef idx="2">
+            <a:schemeClr val="accent1">
+              <a:shade val="50000"/>
+            </a:schemeClr>
+          </a:lnRef>
+          <a:fillRef idx="1">
+            <a:schemeClr val="accent1"/>
+          </a:fillRef>
+          <a:effectRef idx="0">
+            <a:schemeClr val="accent1"/>
+          </a:effectRef>
+          <a:fontRef idx="minor">
+            <a:schemeClr val="lt1"/>
+          </a:fontRef>
+        </p:style>
+        <p:txBody>
+          <a:bodyPr rtlCol="0" anchor="ctr"/>
+          <a:lstStyle/>
+          <a:p>
+            <a:pPr algn="ctr"/>
+            <a:endParaRPr lang="en-US"/>
+          </a:p>
+        </p:txBody>
+      </p:sp>
+      <p:sp>
+        <p:nvSpPr>
+          <p:cNvPr id="2" name="Title 1">
+            <a:extLst>
+              <a:ext uri="{FF2B5EF4-FFF2-40B4-BE49-F238E27FC236}">
+                <a16:creationId xmlns:a16="http://schemas.microsoft.com/office/drawing/2014/main" id="{53C5D828-9666-E312-B574-9FE965A7D6BE}"/>
+              </a:ext>
+            </a:extLst>
+          </p:cNvPr>
+          <p:cNvSpPr>
+            <a:spLocks noGrp="1"/>
+          </p:cNvSpPr>
+          <p:nvPr>
+            <p:ph type="title"/>
+          </p:nvPr>
+        </p:nvSpPr>
+        <p:spPr>
+          <a:xfrm>
+            <a:off x="1028700" y="1967266"/>
+            <a:ext cx="2628900" cy="2547257"/>
+          </a:xfrm>
+          <a:noFill/>
+        </p:spPr>
+        <p:txBody>
+          <a:bodyPr vert="horz" lIns="91440" tIns="45720" rIns="91440" bIns="45720" rtlCol="0" anchor="ctr">
+            <a:normAutofit/>
+          </a:bodyPr>
+          <a:lstStyle/>
+          <a:p>
+            <a:pPr algn="ctr"/>
+            <a:r>
+              <a:rPr lang="en-US" sz="3600" kern="1200" dirty="0">
+                <a:solidFill>
+                  <a:srgbClr val="FFFFFF"/>
+                </a:solidFill>
+                <a:latin typeface="+mj-lt"/>
+                <a:ea typeface="+mj-ea"/>
+                <a:cs typeface="+mj-cs"/>
+              </a:rPr>
+              <a:t>Architecture of Windows</a:t>
+            </a:r>
+          </a:p>
+        </p:txBody>
+      </p:sp>
+      <p:sp>
+        <p:nvSpPr>
+          <p:cNvPr id="3" name="Footer Placeholder 2">
+            <a:extLst>
+              <a:ext uri="{FF2B5EF4-FFF2-40B4-BE49-F238E27FC236}">
+                <a16:creationId xmlns:a16="http://schemas.microsoft.com/office/drawing/2014/main" id="{5AA19FA0-A765-8169-03F1-928E3EF7B595}"/>
+              </a:ext>
+            </a:extLst>
+          </p:cNvPr>
+          <p:cNvSpPr>
+            <a:spLocks noGrp="1"/>
+          </p:cNvSpPr>
+          <p:nvPr>
+            <p:ph type="ftr" sz="quarter" idx="11"/>
+          </p:nvPr>
+        </p:nvSpPr>
+        <p:spPr>
+          <a:xfrm>
+            <a:off x="1028700" y="6356350"/>
+            <a:ext cx="6210300" cy="365125"/>
+          </a:xfrm>
+        </p:spPr>
+        <p:txBody>
+          <a:bodyPr vert="horz" lIns="91440" tIns="45720" rIns="91440" bIns="45720" rtlCol="0" anchor="ctr">
+            <a:normAutofit/>
+          </a:bodyPr>
+          <a:lstStyle/>
+          <a:p>
+            <a:pPr algn="l">
+              <a:spcAft>
+                <a:spcPts val="600"/>
+              </a:spcAft>
+            </a:pPr>
+            <a:r>
+              <a:rPr lang="en-US" kern="1200">
+                <a:solidFill>
+                  <a:schemeClr val="tx1">
+                    <a:alpha val="80000"/>
+                  </a:schemeClr>
+                </a:solidFill>
+                <a:latin typeface="+mn-lt"/>
+                <a:ea typeface="+mn-ea"/>
+                <a:cs typeface="+mn-cs"/>
+              </a:rPr>
+              <a:t>Step 9. OS Administer - ver. 1</a:t>
+            </a:r>
+          </a:p>
+        </p:txBody>
+      </p:sp>
+      <p:pic>
+        <p:nvPicPr>
+          <p:cNvPr id="5" name="Picture 4">
+            <a:extLst>
+              <a:ext uri="{FF2B5EF4-FFF2-40B4-BE49-F238E27FC236}">
+                <a16:creationId xmlns:a16="http://schemas.microsoft.com/office/drawing/2014/main" id="{1B28AA1A-E60F-3632-5A69-475FEC313F4F}"/>
+              </a:ext>
+            </a:extLst>
+          </p:cNvPr>
+          <p:cNvPicPr>
+            <a:picLocks noChangeAspect="1"/>
+          </p:cNvPicPr>
+          <p:nvPr/>
+        </p:nvPicPr>
+        <p:blipFill>
+          <a:blip r:embed="rId2"/>
+          <a:stretch>
+            <a:fillRect/>
+          </a:stretch>
+        </p:blipFill>
+        <p:spPr>
+          <a:xfrm>
+            <a:off x="4844760" y="885322"/>
+            <a:ext cx="6945457" cy="5087355"/>
+          </a:xfrm>
+          <a:prstGeom prst="rect">
+            <a:avLst/>
+          </a:prstGeom>
+        </p:spPr>
+      </p:pic>
+    </p:spTree>
+    <p:extLst>
+      <p:ext uri="{BB962C8B-B14F-4D97-AF65-F5344CB8AC3E}">
+        <p14:creationId xmlns:p14="http://schemas.microsoft.com/office/powerpoint/2010/main" val="2728358054"/>
+      </p:ext>
+    </p:extLst>
+  </p:cSld>
+  <p:clrMapOvr>
+    <a:masterClrMapping/>
+  </p:clrMapOvr>
+</p:sld>
+</file>
+
+<file path=ppt/slides/slide14.xml><?xml version="1.0" encoding="utf-8"?>
+<p:sld xmlns:a="http://schemas.openxmlformats.org/drawingml/2006/main" xmlns:r="http://schemas.openxmlformats.org/officeDocument/2006/relationships" xmlns:p="http://schemas.openxmlformats.org/presentationml/2006/main">
+  <p:cSld>
+    <p:bg>
+      <p:bgPr>
+        <a:solidFill>
+          <a:schemeClr val="bg1"/>
+        </a:solidFill>
+        <a:effectLst/>
+      </p:bgPr>
+    </p:bg>
+    <p:spTree>
+      <p:nvGrpSpPr>
+        <p:cNvPr id="1" name=""/>
+        <p:cNvGrpSpPr/>
+        <p:nvPr/>
+      </p:nvGrpSpPr>
+      <p:grpSpPr>
+        <a:xfrm>
+          <a:off x="0" y="0"/>
+          <a:ext cx="0" cy="0"/>
+          <a:chOff x="0" y="0"/>
+          <a:chExt cx="0" cy="0"/>
+        </a:xfrm>
+      </p:grpSpPr>
+      <p:sp>
+        <p:nvSpPr>
+          <p:cNvPr id="24" name="Down Arrow 7">
+            <a:extLst>
+              <a:ext uri="{FF2B5EF4-FFF2-40B4-BE49-F238E27FC236}">
+                <a16:creationId xmlns:a16="http://schemas.microsoft.com/office/drawing/2014/main" id="{D4771268-CB57-404A-9271-370EB28F6090}"/>
+              </a:ext>
+              <a:ext uri="{C183D7F6-B498-43B3-948B-1728B52AA6E4}">
+                <adec:decorative xmlns:adec="http://schemas.microsoft.com/office/drawing/2017/decorative" val="1"/>
+              </a:ext>
+            </a:extLst>
+          </p:cNvPr>
+          <p:cNvSpPr>
+            <a:spLocks noGrp="1" noRot="1" noChangeAspect="1" noMove="1" noResize="1" noEditPoints="1" noAdjustHandles="1" noChangeArrowheads="1" noChangeShapeType="1" noTextEdit="1"/>
+          </p:cNvSpPr>
+          <p:nvPr>
+            <p:extLst>
+              <p:ext uri="{386F3935-93C4-4BCD-93E2-E3B085C9AB24}">
+                <p16:designElem xmlns:p16="http://schemas.microsoft.com/office/powerpoint/2015/main" val="1"/>
+              </p:ext>
+            </p:extLst>
+          </p:nvPr>
+        </p:nvSpPr>
+        <p:spPr>
+          <a:xfrm rot="16200000">
+            <a:off x="800100" y="1491343"/>
+            <a:ext cx="3333749" cy="3499103"/>
+          </a:xfrm>
+          <a:prstGeom prst="downArrow">
+            <a:avLst>
+              <a:gd name="adj1" fmla="val 100000"/>
+              <a:gd name="adj2" fmla="val 15788"/>
+            </a:avLst>
+          </a:prstGeom>
+          <a:solidFill>
+            <a:srgbClr val="404040"/>
+          </a:solidFill>
+          <a:ln w="53975">
+            <a:noFill/>
+          </a:ln>
+        </p:spPr>
+        <p:style>
+          <a:lnRef idx="2">
+            <a:schemeClr val="accent1">
+              <a:shade val="50000"/>
+            </a:schemeClr>
+          </a:lnRef>
+          <a:fillRef idx="1">
+            <a:schemeClr val="accent1"/>
+          </a:fillRef>
+          <a:effectRef idx="0">
+            <a:schemeClr val="accent1"/>
+          </a:effectRef>
+          <a:fontRef idx="minor">
+            <a:schemeClr val="lt1"/>
+          </a:fontRef>
+        </p:style>
+        <p:txBody>
+          <a:bodyPr rtlCol="0" anchor="ctr"/>
+          <a:lstStyle/>
+          <a:p>
+            <a:pPr algn="ctr"/>
+            <a:endParaRPr lang="en-US"/>
+          </a:p>
+        </p:txBody>
+      </p:sp>
+      <p:sp>
+        <p:nvSpPr>
+          <p:cNvPr id="2" name="Title 1">
+            <a:extLst>
+              <a:ext uri="{FF2B5EF4-FFF2-40B4-BE49-F238E27FC236}">
+                <a16:creationId xmlns:a16="http://schemas.microsoft.com/office/drawing/2014/main" id="{53C5D828-9666-E312-B574-9FE965A7D6BE}"/>
+              </a:ext>
+            </a:extLst>
+          </p:cNvPr>
+          <p:cNvSpPr>
+            <a:spLocks noGrp="1"/>
+          </p:cNvSpPr>
+          <p:nvPr>
+            <p:ph type="title"/>
+          </p:nvPr>
+        </p:nvSpPr>
+        <p:spPr>
+          <a:xfrm>
+            <a:off x="900545" y="1967266"/>
+            <a:ext cx="2743200" cy="2547257"/>
+          </a:xfrm>
+          <a:noFill/>
+        </p:spPr>
+        <p:txBody>
+          <a:bodyPr vert="horz" lIns="91440" tIns="45720" rIns="91440" bIns="45720" rtlCol="0" anchor="ctr">
+            <a:normAutofit/>
+          </a:bodyPr>
+          <a:lstStyle/>
+          <a:p>
+            <a:pPr algn="ctr"/>
+            <a:r>
+              <a:rPr lang="en-US" sz="3600" kern="1200" dirty="0">
+                <a:solidFill>
+                  <a:srgbClr val="FFFFFF"/>
+                </a:solidFill>
+                <a:latin typeface="+mj-lt"/>
+                <a:ea typeface="+mj-ea"/>
+                <a:cs typeface="+mj-cs"/>
+              </a:rPr>
+              <a:t>Stages of Windows Boot Process</a:t>
+            </a:r>
+          </a:p>
+        </p:txBody>
+      </p:sp>
+      <p:sp>
+        <p:nvSpPr>
+          <p:cNvPr id="3" name="Footer Placeholder 2">
+            <a:extLst>
+              <a:ext uri="{FF2B5EF4-FFF2-40B4-BE49-F238E27FC236}">
+                <a16:creationId xmlns:a16="http://schemas.microsoft.com/office/drawing/2014/main" id="{5AA19FA0-A765-8169-03F1-928E3EF7B595}"/>
+              </a:ext>
+            </a:extLst>
+          </p:cNvPr>
+          <p:cNvSpPr>
+            <a:spLocks noGrp="1"/>
+          </p:cNvSpPr>
+          <p:nvPr>
+            <p:ph type="ftr" sz="quarter" idx="11"/>
+          </p:nvPr>
+        </p:nvSpPr>
+        <p:spPr/>
+        <p:txBody>
+          <a:bodyPr/>
+          <a:lstStyle/>
+          <a:p>
+            <a:r>
+              <a:rPr lang="pt-BR"/>
+              <a:t>Step 9. OS Administer - ver. 1</a:t>
+            </a:r>
+            <a:endParaRPr lang="ru-UA"/>
+          </a:p>
+        </p:txBody>
+      </p:sp>
+      <p:pic>
+        <p:nvPicPr>
+          <p:cNvPr id="9" name="Picture 8">
+            <a:extLst>
+              <a:ext uri="{FF2B5EF4-FFF2-40B4-BE49-F238E27FC236}">
+                <a16:creationId xmlns:a16="http://schemas.microsoft.com/office/drawing/2014/main" id="{0CB9CF3F-9D7A-7D3B-EFF6-BF6952DEEE7B}"/>
+              </a:ext>
+            </a:extLst>
+          </p:cNvPr>
+          <p:cNvPicPr>
+            <a:picLocks noChangeAspect="1"/>
+          </p:cNvPicPr>
+          <p:nvPr/>
+        </p:nvPicPr>
+        <p:blipFill>
+          <a:blip r:embed="rId2"/>
+          <a:stretch>
+            <a:fillRect/>
+          </a:stretch>
+        </p:blipFill>
+        <p:spPr>
+          <a:xfrm>
+            <a:off x="5618778" y="415636"/>
+            <a:ext cx="5069244" cy="5449437"/>
+          </a:xfrm>
+          <a:prstGeom prst="rect">
+            <a:avLst/>
+          </a:prstGeom>
+        </p:spPr>
+      </p:pic>
+    </p:spTree>
+    <p:extLst>
+      <p:ext uri="{BB962C8B-B14F-4D97-AF65-F5344CB8AC3E}">
+        <p14:creationId xmlns:p14="http://schemas.microsoft.com/office/powerpoint/2010/main" val="1133112284"/>
+      </p:ext>
+    </p:extLst>
+  </p:cSld>
+  <p:clrMapOvr>
+    <a:masterClrMapping/>
+  </p:clrMapOvr>
+</p:sld>
+</file>
+
+<file path=ppt/slides/slide15.xml><?xml version="1.0" encoding="utf-8"?>
+<p:sld xmlns:a="http://schemas.openxmlformats.org/drawingml/2006/main" xmlns:r="http://schemas.openxmlformats.org/officeDocument/2006/relationships" xmlns:p="http://schemas.openxmlformats.org/presentationml/2006/main">
+  <p:cSld>
+    <p:bg>
+      <p:bgPr>
+        <a:solidFill>
+          <a:schemeClr val="bg1"/>
+        </a:solidFill>
+        <a:effectLst/>
+      </p:bgPr>
+    </p:bg>
+    <p:spTree>
+      <p:nvGrpSpPr>
+        <p:cNvPr id="1" name=""/>
+        <p:cNvGrpSpPr/>
+        <p:nvPr/>
+      </p:nvGrpSpPr>
+      <p:grpSpPr>
+        <a:xfrm>
+          <a:off x="0" y="0"/>
+          <a:ext cx="0" cy="0"/>
+          <a:chOff x="0" y="0"/>
+          <a:chExt cx="0" cy="0"/>
+        </a:xfrm>
+      </p:grpSpPr>
+      <p:sp>
+        <p:nvSpPr>
+          <p:cNvPr id="24" name="Down Arrow 7">
+            <a:extLst>
+              <a:ext uri="{FF2B5EF4-FFF2-40B4-BE49-F238E27FC236}">
+                <a16:creationId xmlns:a16="http://schemas.microsoft.com/office/drawing/2014/main" id="{D4771268-CB57-404A-9271-370EB28F6090}"/>
+              </a:ext>
+              <a:ext uri="{C183D7F6-B498-43B3-948B-1728B52AA6E4}">
+                <adec:decorative xmlns:adec="http://schemas.microsoft.com/office/drawing/2017/decorative" val="1"/>
+              </a:ext>
+            </a:extLst>
+          </p:cNvPr>
+          <p:cNvSpPr>
+            <a:spLocks noGrp="1" noRot="1" noChangeAspect="1" noMove="1" noResize="1" noEditPoints="1" noAdjustHandles="1" noChangeArrowheads="1" noChangeShapeType="1" noTextEdit="1"/>
+          </p:cNvSpPr>
+          <p:nvPr>
+            <p:extLst>
+              <p:ext uri="{386F3935-93C4-4BCD-93E2-E3B085C9AB24}">
+                <p16:designElem xmlns:p16="http://schemas.microsoft.com/office/powerpoint/2015/main" val="1"/>
+              </p:ext>
+            </p:extLst>
+          </p:nvPr>
+        </p:nvSpPr>
+        <p:spPr>
+          <a:xfrm rot="16200000">
+            <a:off x="800100" y="1491343"/>
+            <a:ext cx="3333749" cy="3499103"/>
+          </a:xfrm>
+          <a:prstGeom prst="downArrow">
+            <a:avLst>
+              <a:gd name="adj1" fmla="val 100000"/>
+              <a:gd name="adj2" fmla="val 15788"/>
+            </a:avLst>
+          </a:prstGeom>
+          <a:solidFill>
+            <a:srgbClr val="404040"/>
+          </a:solidFill>
+          <a:ln w="53975">
+            <a:noFill/>
+          </a:ln>
+        </p:spPr>
+        <p:style>
+          <a:lnRef idx="2">
+            <a:schemeClr val="accent1">
+              <a:shade val="50000"/>
+            </a:schemeClr>
+          </a:lnRef>
+          <a:fillRef idx="1">
+            <a:schemeClr val="accent1"/>
+          </a:fillRef>
+          <a:effectRef idx="0">
+            <a:schemeClr val="accent1"/>
+          </a:effectRef>
+          <a:fontRef idx="minor">
+            <a:schemeClr val="lt1"/>
+          </a:fontRef>
+        </p:style>
+        <p:txBody>
+          <a:bodyPr rtlCol="0" anchor="ctr"/>
+          <a:lstStyle/>
+          <a:p>
+            <a:pPr algn="ctr"/>
+            <a:endParaRPr lang="en-US"/>
+          </a:p>
+        </p:txBody>
+      </p:sp>
+      <p:sp>
+        <p:nvSpPr>
+          <p:cNvPr id="2" name="Title 1">
+            <a:extLst>
+              <a:ext uri="{FF2B5EF4-FFF2-40B4-BE49-F238E27FC236}">
+                <a16:creationId xmlns:a16="http://schemas.microsoft.com/office/drawing/2014/main" id="{53C5D828-9666-E312-B574-9FE965A7D6BE}"/>
+              </a:ext>
+            </a:extLst>
+          </p:cNvPr>
+          <p:cNvSpPr>
+            <a:spLocks noGrp="1"/>
+          </p:cNvSpPr>
+          <p:nvPr>
+            <p:ph type="title"/>
+          </p:nvPr>
+        </p:nvSpPr>
+        <p:spPr>
+          <a:xfrm>
+            <a:off x="900545" y="1967266"/>
+            <a:ext cx="2743200" cy="2547257"/>
+          </a:xfrm>
+          <a:noFill/>
+        </p:spPr>
+        <p:txBody>
+          <a:bodyPr vert="horz" lIns="91440" tIns="45720" rIns="91440" bIns="45720" rtlCol="0" anchor="ctr">
+            <a:normAutofit/>
+          </a:bodyPr>
+          <a:lstStyle/>
+          <a:p>
+            <a:pPr algn="ctr"/>
+            <a:r>
+              <a:rPr lang="en-US" sz="3600" kern="1200" dirty="0">
+                <a:solidFill>
+                  <a:srgbClr val="FFFFFF"/>
+                </a:solidFill>
+                <a:latin typeface="+mj-lt"/>
+                <a:ea typeface="+mj-ea"/>
+                <a:cs typeface="+mj-cs"/>
+              </a:rPr>
+              <a:t>NTFS Permissions</a:t>
+            </a:r>
+          </a:p>
+        </p:txBody>
+      </p:sp>
+      <p:sp>
+        <p:nvSpPr>
+          <p:cNvPr id="3" name="Footer Placeholder 2">
+            <a:extLst>
+              <a:ext uri="{FF2B5EF4-FFF2-40B4-BE49-F238E27FC236}">
+                <a16:creationId xmlns:a16="http://schemas.microsoft.com/office/drawing/2014/main" id="{5AA19FA0-A765-8169-03F1-928E3EF7B595}"/>
+              </a:ext>
+            </a:extLst>
+          </p:cNvPr>
+          <p:cNvSpPr>
+            <a:spLocks noGrp="1"/>
+          </p:cNvSpPr>
+          <p:nvPr>
+            <p:ph type="ftr" sz="quarter" idx="11"/>
+          </p:nvPr>
+        </p:nvSpPr>
+        <p:spPr/>
+        <p:txBody>
+          <a:bodyPr/>
+          <a:lstStyle/>
+          <a:p>
+            <a:r>
+              <a:rPr lang="pt-BR"/>
+              <a:t>Step 9. OS Administer - ver. 1</a:t>
+            </a:r>
+            <a:endParaRPr lang="ru-UA"/>
+          </a:p>
+        </p:txBody>
+      </p:sp>
+      <p:pic>
+        <p:nvPicPr>
+          <p:cNvPr id="5" name="Picture 4">
+            <a:extLst>
+              <a:ext uri="{FF2B5EF4-FFF2-40B4-BE49-F238E27FC236}">
+                <a16:creationId xmlns:a16="http://schemas.microsoft.com/office/drawing/2014/main" id="{0F423EE0-1771-105D-CB7E-D0D7194C8FB6}"/>
+              </a:ext>
+            </a:extLst>
+          </p:cNvPr>
+          <p:cNvPicPr>
+            <a:picLocks noChangeAspect="1"/>
+          </p:cNvPicPr>
+          <p:nvPr/>
+        </p:nvPicPr>
+        <p:blipFill>
+          <a:blip r:embed="rId2"/>
+          <a:stretch>
+            <a:fillRect/>
+          </a:stretch>
+        </p:blipFill>
+        <p:spPr>
+          <a:xfrm>
+            <a:off x="4637991" y="1026167"/>
+            <a:ext cx="6836587" cy="4429453"/>
+          </a:xfrm>
+          <a:prstGeom prst="rect">
+            <a:avLst/>
+          </a:prstGeom>
+        </p:spPr>
+      </p:pic>
+    </p:spTree>
+    <p:extLst>
+      <p:ext uri="{BB962C8B-B14F-4D97-AF65-F5344CB8AC3E}">
+        <p14:creationId xmlns:p14="http://schemas.microsoft.com/office/powerpoint/2010/main" val="862344913"/>
+      </p:ext>
+    </p:extLst>
+  </p:cSld>
+  <p:clrMapOvr>
+    <a:masterClrMapping/>
+  </p:clrMapOvr>
+</p:sld>
+</file>
+
+<file path=ppt/slides/slide16.xml><?xml version="1.0" encoding="utf-8"?>
+<p:sld xmlns:a="http://schemas.openxmlformats.org/drawingml/2006/main" xmlns:r="http://schemas.openxmlformats.org/officeDocument/2006/relationships" xmlns:p="http://schemas.openxmlformats.org/presentationml/2006/main">
+  <p:cSld>
+    <p:bg>
+      <p:bgPr>
+        <a:solidFill>
+          <a:schemeClr val="bg1"/>
+        </a:solidFill>
+        <a:effectLst/>
+      </p:bgPr>
+    </p:bg>
+    <p:spTree>
+      <p:nvGrpSpPr>
+        <p:cNvPr id="1" name=""/>
+        <p:cNvGrpSpPr/>
+        <p:nvPr/>
+      </p:nvGrpSpPr>
+      <p:grpSpPr>
+        <a:xfrm>
+          <a:off x="0" y="0"/>
+          <a:ext cx="0" cy="0"/>
+          <a:chOff x="0" y="0"/>
+          <a:chExt cx="0" cy="0"/>
+        </a:xfrm>
+      </p:grpSpPr>
+      <p:sp>
+        <p:nvSpPr>
+          <p:cNvPr id="24" name="Down Arrow 7">
+            <a:extLst>
+              <a:ext uri="{FF2B5EF4-FFF2-40B4-BE49-F238E27FC236}">
+                <a16:creationId xmlns:a16="http://schemas.microsoft.com/office/drawing/2014/main" id="{D4771268-CB57-404A-9271-370EB28F6090}"/>
+              </a:ext>
+              <a:ext uri="{C183D7F6-B498-43B3-948B-1728B52AA6E4}">
+                <adec:decorative xmlns:adec="http://schemas.microsoft.com/office/drawing/2017/decorative" val="1"/>
+              </a:ext>
+            </a:extLst>
+          </p:cNvPr>
+          <p:cNvSpPr>
+            <a:spLocks noGrp="1" noRot="1" noChangeAspect="1" noMove="1" noResize="1" noEditPoints="1" noAdjustHandles="1" noChangeArrowheads="1" noChangeShapeType="1" noTextEdit="1"/>
+          </p:cNvSpPr>
+          <p:nvPr>
+            <p:extLst>
+              <p:ext uri="{386F3935-93C4-4BCD-93E2-E3B085C9AB24}">
+                <p16:designElem xmlns:p16="http://schemas.microsoft.com/office/powerpoint/2015/main" val="1"/>
+              </p:ext>
+            </p:extLst>
+          </p:nvPr>
+        </p:nvSpPr>
+        <p:spPr>
+          <a:xfrm rot="16200000">
+            <a:off x="800100" y="1491343"/>
+            <a:ext cx="3333749" cy="3499103"/>
+          </a:xfrm>
+          <a:prstGeom prst="downArrow">
+            <a:avLst>
+              <a:gd name="adj1" fmla="val 100000"/>
+              <a:gd name="adj2" fmla="val 15788"/>
+            </a:avLst>
+          </a:prstGeom>
+          <a:solidFill>
+            <a:srgbClr val="404040"/>
+          </a:solidFill>
+          <a:ln w="53975">
+            <a:noFill/>
+          </a:ln>
+        </p:spPr>
+        <p:style>
+          <a:lnRef idx="2">
+            <a:schemeClr val="accent1">
+              <a:shade val="50000"/>
+            </a:schemeClr>
+          </a:lnRef>
+          <a:fillRef idx="1">
+            <a:schemeClr val="accent1"/>
+          </a:fillRef>
+          <a:effectRef idx="0">
+            <a:schemeClr val="accent1"/>
+          </a:effectRef>
+          <a:fontRef idx="minor">
+            <a:schemeClr val="lt1"/>
+          </a:fontRef>
+        </p:style>
+        <p:txBody>
+          <a:bodyPr rtlCol="0" anchor="ctr"/>
+          <a:lstStyle/>
+          <a:p>
+            <a:pPr algn="ctr"/>
+            <a:endParaRPr lang="en-US"/>
+          </a:p>
+        </p:txBody>
+      </p:sp>
+      <p:sp>
+        <p:nvSpPr>
+          <p:cNvPr id="2" name="Title 1">
+            <a:extLst>
+              <a:ext uri="{FF2B5EF4-FFF2-40B4-BE49-F238E27FC236}">
+                <a16:creationId xmlns:a16="http://schemas.microsoft.com/office/drawing/2014/main" id="{53C5D828-9666-E312-B574-9FE965A7D6BE}"/>
+              </a:ext>
+            </a:extLst>
+          </p:cNvPr>
+          <p:cNvSpPr>
+            <a:spLocks noGrp="1"/>
+          </p:cNvSpPr>
+          <p:nvPr>
+            <p:ph type="title"/>
+          </p:nvPr>
+        </p:nvSpPr>
+        <p:spPr>
+          <a:xfrm>
+            <a:off x="900545" y="1967266"/>
+            <a:ext cx="2743200" cy="2547257"/>
+          </a:xfrm>
+          <a:noFill/>
+        </p:spPr>
+        <p:txBody>
+          <a:bodyPr vert="horz" lIns="91440" tIns="45720" rIns="91440" bIns="45720" rtlCol="0" anchor="ctr">
+            <a:normAutofit/>
+          </a:bodyPr>
+          <a:lstStyle/>
+          <a:p>
+            <a:pPr algn="ctr"/>
+            <a:r>
+              <a:rPr lang="en-US" sz="3600" kern="1200" dirty="0">
+                <a:solidFill>
+                  <a:srgbClr val="FFFFFF"/>
+                </a:solidFill>
+                <a:latin typeface="+mj-lt"/>
+                <a:ea typeface="+mj-ea"/>
+                <a:cs typeface="+mj-cs"/>
+              </a:rPr>
+              <a:t>Windows Shells</a:t>
+            </a:r>
+          </a:p>
+        </p:txBody>
+      </p:sp>
+      <p:sp>
+        <p:nvSpPr>
+          <p:cNvPr id="3" name="Footer Placeholder 2">
+            <a:extLst>
+              <a:ext uri="{FF2B5EF4-FFF2-40B4-BE49-F238E27FC236}">
+                <a16:creationId xmlns:a16="http://schemas.microsoft.com/office/drawing/2014/main" id="{5AA19FA0-A765-8169-03F1-928E3EF7B595}"/>
+              </a:ext>
+            </a:extLst>
+          </p:cNvPr>
+          <p:cNvSpPr>
+            <a:spLocks noGrp="1"/>
+          </p:cNvSpPr>
+          <p:nvPr>
+            <p:ph type="ftr" sz="quarter" idx="11"/>
+          </p:nvPr>
+        </p:nvSpPr>
+        <p:spPr/>
+        <p:txBody>
+          <a:bodyPr/>
+          <a:lstStyle/>
+          <a:p>
+            <a:r>
+              <a:rPr lang="pt-BR"/>
+              <a:t>Step 9. OS Administer - ver. 1</a:t>
+            </a:r>
+            <a:endParaRPr lang="ru-UA"/>
+          </a:p>
+        </p:txBody>
+      </p:sp>
+      <p:pic>
+        <p:nvPicPr>
+          <p:cNvPr id="6" name="Picture 5" descr="A blue square with a white arrow&#10;&#10;Description automatically generated">
+            <a:extLst>
+              <a:ext uri="{FF2B5EF4-FFF2-40B4-BE49-F238E27FC236}">
+                <a16:creationId xmlns:a16="http://schemas.microsoft.com/office/drawing/2014/main" id="{A4623169-C9BD-F6FF-E931-9389ADE083F5}"/>
+              </a:ext>
+            </a:extLst>
+          </p:cNvPr>
+          <p:cNvPicPr>
+            <a:picLocks noChangeAspect="1"/>
+          </p:cNvPicPr>
+          <p:nvPr/>
+        </p:nvPicPr>
+        <p:blipFill>
+          <a:blip r:embed="rId2">
+            <a:extLst>
+              <a:ext uri="{28A0092B-C50C-407E-A947-70E740481C1C}">
+                <a14:useLocalDpi xmlns:a14="http://schemas.microsoft.com/office/drawing/2010/main" val="0"/>
+              </a:ext>
+            </a:extLst>
+          </a:blip>
+          <a:stretch>
+            <a:fillRect/>
+          </a:stretch>
+        </p:blipFill>
+        <p:spPr>
+          <a:xfrm>
+            <a:off x="4772891" y="1085952"/>
+            <a:ext cx="4393651" cy="3428571"/>
+          </a:xfrm>
+          <a:prstGeom prst="rect">
+            <a:avLst/>
+          </a:prstGeom>
+        </p:spPr>
+      </p:pic>
+      <p:pic>
+        <p:nvPicPr>
+          <p:cNvPr id="7" name="Picture 6">
+            <a:extLst>
+              <a:ext uri="{FF2B5EF4-FFF2-40B4-BE49-F238E27FC236}">
+                <a16:creationId xmlns:a16="http://schemas.microsoft.com/office/drawing/2014/main" id="{C5AFF61D-FA86-2E17-1507-858507EEE762}"/>
+              </a:ext>
+            </a:extLst>
+          </p:cNvPr>
+          <p:cNvPicPr>
+            <a:picLocks noChangeAspect="1"/>
+          </p:cNvPicPr>
+          <p:nvPr/>
+        </p:nvPicPr>
+        <p:blipFill>
+          <a:blip r:embed="rId3"/>
+          <a:stretch>
+            <a:fillRect/>
+          </a:stretch>
+        </p:blipFill>
+        <p:spPr>
+          <a:xfrm>
+            <a:off x="7874955" y="2985248"/>
+            <a:ext cx="1922521" cy="1922521"/>
+          </a:xfrm>
+          <a:prstGeom prst="rect">
+            <a:avLst/>
+          </a:prstGeom>
+        </p:spPr>
+      </p:pic>
+    </p:spTree>
+    <p:extLst>
+      <p:ext uri="{BB962C8B-B14F-4D97-AF65-F5344CB8AC3E}">
+        <p14:creationId xmlns:p14="http://schemas.microsoft.com/office/powerpoint/2010/main" val="1527920387"/>
+      </p:ext>
+    </p:extLst>
+  </p:cSld>
+  <p:clrMapOvr>
+    <a:masterClrMapping/>
+  </p:clrMapOvr>
+</p:sld>
+</file>
+
+<file path=ppt/slides/slide17.xml><?xml version="1.0" encoding="utf-8"?>
+<p:sld xmlns:a="http://schemas.openxmlformats.org/drawingml/2006/main" xmlns:r="http://schemas.openxmlformats.org/officeDocument/2006/relationships" xmlns:p="http://schemas.openxmlformats.org/presentationml/2006/main">
+  <p:cSld>
+    <p:bg>
+      <p:bgPr>
+        <a:solidFill>
+          <a:schemeClr val="bg1"/>
+        </a:solidFill>
+        <a:effectLst/>
+      </p:bgPr>
+    </p:bg>
+    <p:spTree>
+      <p:nvGrpSpPr>
+        <p:cNvPr id="1" name=""/>
+        <p:cNvGrpSpPr/>
+        <p:nvPr/>
+      </p:nvGrpSpPr>
+      <p:grpSpPr>
+        <a:xfrm>
+          <a:off x="0" y="0"/>
+          <a:ext cx="0" cy="0"/>
+          <a:chOff x="0" y="0"/>
+          <a:chExt cx="0" cy="0"/>
+        </a:xfrm>
+      </p:grpSpPr>
+      <p:sp>
+        <p:nvSpPr>
+          <p:cNvPr id="24" name="Down Arrow 7">
+            <a:extLst>
+              <a:ext uri="{FF2B5EF4-FFF2-40B4-BE49-F238E27FC236}">
+                <a16:creationId xmlns:a16="http://schemas.microsoft.com/office/drawing/2014/main" id="{D4771268-CB57-404A-9271-370EB28F6090}"/>
+              </a:ext>
+              <a:ext uri="{C183D7F6-B498-43B3-948B-1728B52AA6E4}">
+                <adec:decorative xmlns:adec="http://schemas.microsoft.com/office/drawing/2017/decorative" val="1"/>
+              </a:ext>
+            </a:extLst>
+          </p:cNvPr>
+          <p:cNvSpPr>
+            <a:spLocks noGrp="1" noRot="1" noChangeAspect="1" noMove="1" noResize="1" noEditPoints="1" noAdjustHandles="1" noChangeArrowheads="1" noChangeShapeType="1" noTextEdit="1"/>
+          </p:cNvSpPr>
+          <p:nvPr>
+            <p:extLst>
+              <p:ext uri="{386F3935-93C4-4BCD-93E2-E3B085C9AB24}">
+                <p16:designElem xmlns:p16="http://schemas.microsoft.com/office/powerpoint/2015/main" val="1"/>
+              </p:ext>
+            </p:extLst>
+          </p:nvPr>
+        </p:nvSpPr>
+        <p:spPr>
+          <a:xfrm rot="16200000">
+            <a:off x="800100" y="1491343"/>
+            <a:ext cx="3333749" cy="3499103"/>
+          </a:xfrm>
+          <a:prstGeom prst="downArrow">
+            <a:avLst>
+              <a:gd name="adj1" fmla="val 100000"/>
+              <a:gd name="adj2" fmla="val 15788"/>
+            </a:avLst>
+          </a:prstGeom>
+          <a:solidFill>
+            <a:srgbClr val="404040"/>
+          </a:solidFill>
+          <a:ln w="53975">
+            <a:noFill/>
+          </a:ln>
+        </p:spPr>
+        <p:style>
+          <a:lnRef idx="2">
+            <a:schemeClr val="accent1">
+              <a:shade val="50000"/>
+            </a:schemeClr>
+          </a:lnRef>
+          <a:fillRef idx="1">
+            <a:schemeClr val="accent1"/>
+          </a:fillRef>
+          <a:effectRef idx="0">
+            <a:schemeClr val="accent1"/>
+          </a:effectRef>
+          <a:fontRef idx="minor">
+            <a:schemeClr val="lt1"/>
+          </a:fontRef>
+        </p:style>
+        <p:txBody>
+          <a:bodyPr rtlCol="0" anchor="ctr"/>
+          <a:lstStyle/>
+          <a:p>
+            <a:pPr algn="ctr"/>
+            <a:endParaRPr lang="en-US"/>
+          </a:p>
+        </p:txBody>
+      </p:sp>
+      <p:sp>
+        <p:nvSpPr>
+          <p:cNvPr id="2" name="Title 1">
+            <a:extLst>
+              <a:ext uri="{FF2B5EF4-FFF2-40B4-BE49-F238E27FC236}">
+                <a16:creationId xmlns:a16="http://schemas.microsoft.com/office/drawing/2014/main" id="{53C5D828-9666-E312-B574-9FE965A7D6BE}"/>
+              </a:ext>
+            </a:extLst>
+          </p:cNvPr>
+          <p:cNvSpPr>
+            <a:spLocks noGrp="1"/>
+          </p:cNvSpPr>
+          <p:nvPr>
+            <p:ph type="title"/>
+          </p:nvPr>
+        </p:nvSpPr>
+        <p:spPr>
+          <a:xfrm>
+            <a:off x="900545" y="1967266"/>
+            <a:ext cx="2743200" cy="2547257"/>
+          </a:xfrm>
+          <a:noFill/>
+        </p:spPr>
+        <p:txBody>
+          <a:bodyPr vert="horz" lIns="91440" tIns="45720" rIns="91440" bIns="45720" rtlCol="0" anchor="ctr">
+            <a:normAutofit/>
+          </a:bodyPr>
+          <a:lstStyle/>
+          <a:p>
+            <a:pPr algn="ctr"/>
+            <a:r>
+              <a:rPr lang="en-US" sz="3600" kern="1200" dirty="0">
+                <a:solidFill>
+                  <a:srgbClr val="FFFFFF"/>
+                </a:solidFill>
+                <a:latin typeface="+mj-lt"/>
+                <a:ea typeface="+mj-ea"/>
+                <a:cs typeface="+mj-cs"/>
+              </a:rPr>
+              <a:t>Windows Shells Scripts</a:t>
+            </a:r>
+          </a:p>
+        </p:txBody>
+      </p:sp>
+      <p:sp>
+        <p:nvSpPr>
+          <p:cNvPr id="3" name="Footer Placeholder 2">
+            <a:extLst>
+              <a:ext uri="{FF2B5EF4-FFF2-40B4-BE49-F238E27FC236}">
+                <a16:creationId xmlns:a16="http://schemas.microsoft.com/office/drawing/2014/main" id="{5AA19FA0-A765-8169-03F1-928E3EF7B595}"/>
+              </a:ext>
+            </a:extLst>
+          </p:cNvPr>
+          <p:cNvSpPr>
+            <a:spLocks noGrp="1"/>
+          </p:cNvSpPr>
+          <p:nvPr>
+            <p:ph type="ftr" sz="quarter" idx="11"/>
+          </p:nvPr>
+        </p:nvSpPr>
+        <p:spPr/>
+        <p:txBody>
+          <a:bodyPr/>
+          <a:lstStyle/>
+          <a:p>
+            <a:r>
+              <a:rPr lang="pt-BR"/>
+              <a:t>Step 9. OS Administer - ver. 1</a:t>
+            </a:r>
+            <a:endParaRPr lang="ru-UA"/>
+          </a:p>
+        </p:txBody>
+      </p:sp>
+      <p:pic>
+        <p:nvPicPr>
+          <p:cNvPr id="5" name="Picture 4">
+            <a:extLst>
+              <a:ext uri="{FF2B5EF4-FFF2-40B4-BE49-F238E27FC236}">
+                <a16:creationId xmlns:a16="http://schemas.microsoft.com/office/drawing/2014/main" id="{8EDC4718-98B8-6034-BF50-9E0E916A7B98}"/>
+              </a:ext>
+            </a:extLst>
+          </p:cNvPr>
+          <p:cNvPicPr>
+            <a:picLocks noChangeAspect="1"/>
+          </p:cNvPicPr>
+          <p:nvPr/>
+        </p:nvPicPr>
+        <p:blipFill rotWithShape="1">
+          <a:blip r:embed="rId2"/>
+          <a:srcRect r="19457"/>
+          <a:stretch/>
+        </p:blipFill>
+        <p:spPr>
+          <a:xfrm>
+            <a:off x="4399649" y="1375282"/>
+            <a:ext cx="7182751" cy="3731224"/>
+          </a:xfrm>
+          <a:prstGeom prst="rect">
+            <a:avLst/>
+          </a:prstGeom>
+        </p:spPr>
+      </p:pic>
+    </p:spTree>
+    <p:extLst>
+      <p:ext uri="{BB962C8B-B14F-4D97-AF65-F5344CB8AC3E}">
+        <p14:creationId xmlns:p14="http://schemas.microsoft.com/office/powerpoint/2010/main" val="2349704742"/>
       </p:ext>
     </p:extLst>
   </p:cSld>
@@ -15873,14 +17624,14 @@
             <p:ph idx="1"/>
             <p:extLst>
               <p:ext uri="{D42A27DB-BD31-4B8C-83A1-F6EECF244321}">
-                <p14:modId xmlns:p14="http://schemas.microsoft.com/office/powerpoint/2010/main" val="1567542733"/>
+                <p14:modId xmlns:p14="http://schemas.microsoft.com/office/powerpoint/2010/main" val="1543387280"/>
               </p:ext>
             </p:extLst>
           </p:nvPr>
         </p:nvGraphicFramePr>
         <p:xfrm>
           <a:off x="4654732" y="2453640"/>
-          <a:ext cx="6390623" cy="1629295"/>
+          <a:ext cx="6899959" cy="3028604"/>
         </p:xfrm>
         <a:graphic>
           <a:graphicData uri="http://schemas.openxmlformats.org/drawingml/2006/diagram">

</xml_diff>